<commit_message>
Modified  the intro slide
</commit_message>
<xml_diff>
--- a/Feature Engineering.PPTX
+++ b/Feature Engineering.PPTX
@@ -6662,8 +6662,13 @@
             </a:pPr>
             <a:r>
               <a:rPr lang="en-US" sz="2000" dirty="0"/>
-              <a:t>I work for NextGen HealthCare ( Sr. Data Architect)</a:t>
-            </a:r>
+              <a:t>I work for </a:t>
+            </a:r>
+            <a:r>
+              <a:rPr lang="en-US" sz="2000"/>
+              <a:t>NextGen HealthCare</a:t>
+            </a:r>
+            <a:endParaRPr lang="en-US" sz="2000" dirty="0"/>
           </a:p>
           <a:p>
             <a:pPr marL="342900" indent="-342900">

</xml_diff>